<commit_message>
updated ca-management - powerpoint
</commit_message>
<xml_diff>
--- a/ca management site.pptx
+++ b/ca management site.pptx
@@ -7,6 +7,7 @@
   <p:sldIdLst>
     <p:sldId id="256" r:id="rId2"/>
     <p:sldId id="257" r:id="rId3"/>
+    <p:sldId id="258" r:id="rId4"/>
   </p:sldIdLst>
   <p:sldSz cx="27432000" cy="27432000"/>
   <p:notesSz cx="6858000" cy="9144000"/>
@@ -290,7 +291,7 @@
             <a:fld id="{8BEB2C70-3864-48F5-BE56-758733013DCA}" type="datetimeFigureOut">
               <a:rPr lang="en-US" smtClean="0"/>
               <a:pPr/>
-              <a:t>12/25/2016</a:t>
+              <a:t>12/28/2016</a:t>
             </a:fld>
             <a:endParaRPr lang="en-US"/>
           </a:p>
@@ -457,7 +458,7 @@
             <a:fld id="{8BEB2C70-3864-48F5-BE56-758733013DCA}" type="datetimeFigureOut">
               <a:rPr lang="en-US" smtClean="0"/>
               <a:pPr/>
-              <a:t>12/25/2016</a:t>
+              <a:t>12/28/2016</a:t>
             </a:fld>
             <a:endParaRPr lang="en-US"/>
           </a:p>
@@ -634,7 +635,7 @@
             <a:fld id="{8BEB2C70-3864-48F5-BE56-758733013DCA}" type="datetimeFigureOut">
               <a:rPr lang="en-US" smtClean="0"/>
               <a:pPr/>
-              <a:t>12/25/2016</a:t>
+              <a:t>12/28/2016</a:t>
             </a:fld>
             <a:endParaRPr lang="en-US"/>
           </a:p>
@@ -801,7 +802,7 @@
             <a:fld id="{8BEB2C70-3864-48F5-BE56-758733013DCA}" type="datetimeFigureOut">
               <a:rPr lang="en-US" smtClean="0"/>
               <a:pPr/>
-              <a:t>12/25/2016</a:t>
+              <a:t>12/28/2016</a:t>
             </a:fld>
             <a:endParaRPr lang="en-US"/>
           </a:p>
@@ -1044,7 +1045,7 @@
             <a:fld id="{8BEB2C70-3864-48F5-BE56-758733013DCA}" type="datetimeFigureOut">
               <a:rPr lang="en-US" smtClean="0"/>
               <a:pPr/>
-              <a:t>12/25/2016</a:t>
+              <a:t>12/28/2016</a:t>
             </a:fld>
             <a:endParaRPr lang="en-US"/>
           </a:p>
@@ -1329,7 +1330,7 @@
             <a:fld id="{8BEB2C70-3864-48F5-BE56-758733013DCA}" type="datetimeFigureOut">
               <a:rPr lang="en-US" smtClean="0"/>
               <a:pPr/>
-              <a:t>12/25/2016</a:t>
+              <a:t>12/28/2016</a:t>
             </a:fld>
             <a:endParaRPr lang="en-US"/>
           </a:p>
@@ -1748,7 +1749,7 @@
             <a:fld id="{8BEB2C70-3864-48F5-BE56-758733013DCA}" type="datetimeFigureOut">
               <a:rPr lang="en-US" smtClean="0"/>
               <a:pPr/>
-              <a:t>12/25/2016</a:t>
+              <a:t>12/28/2016</a:t>
             </a:fld>
             <a:endParaRPr lang="en-US"/>
           </a:p>
@@ -1863,7 +1864,7 @@
             <a:fld id="{8BEB2C70-3864-48F5-BE56-758733013DCA}" type="datetimeFigureOut">
               <a:rPr lang="en-US" smtClean="0"/>
               <a:pPr/>
-              <a:t>12/25/2016</a:t>
+              <a:t>12/28/2016</a:t>
             </a:fld>
             <a:endParaRPr lang="en-US"/>
           </a:p>
@@ -1955,7 +1956,7 @@
             <a:fld id="{8BEB2C70-3864-48F5-BE56-758733013DCA}" type="datetimeFigureOut">
               <a:rPr lang="en-US" smtClean="0"/>
               <a:pPr/>
-              <a:t>12/25/2016</a:t>
+              <a:t>12/28/2016</a:t>
             </a:fld>
             <a:endParaRPr lang="en-US"/>
           </a:p>
@@ -2229,7 +2230,7 @@
             <a:fld id="{8BEB2C70-3864-48F5-BE56-758733013DCA}" type="datetimeFigureOut">
               <a:rPr lang="en-US" smtClean="0"/>
               <a:pPr/>
-              <a:t>12/25/2016</a:t>
+              <a:t>12/28/2016</a:t>
             </a:fld>
             <a:endParaRPr lang="en-US"/>
           </a:p>
@@ -2479,7 +2480,7 @@
             <a:fld id="{8BEB2C70-3864-48F5-BE56-758733013DCA}" type="datetimeFigureOut">
               <a:rPr lang="en-US" smtClean="0"/>
               <a:pPr/>
-              <a:t>12/25/2016</a:t>
+              <a:t>12/28/2016</a:t>
             </a:fld>
             <a:endParaRPr lang="en-US"/>
           </a:p>
@@ -2689,7 +2690,7 @@
             <a:fld id="{8BEB2C70-3864-48F5-BE56-758733013DCA}" type="datetimeFigureOut">
               <a:rPr lang="en-US" smtClean="0"/>
               <a:pPr/>
-              <a:t>12/25/2016</a:t>
+              <a:t>12/28/2016</a:t>
             </a:fld>
             <a:endParaRPr lang="en-US"/>
           </a:p>
@@ -3743,7 +3744,7 @@
         </p:nvSpPr>
         <p:spPr>
           <a:xfrm>
-            <a:off x="9753600" y="9982200"/>
+            <a:off x="5105400" y="9982200"/>
             <a:ext cx="2704330" cy="369332"/>
           </a:xfrm>
           <a:prstGeom prst="rect">
@@ -3773,8 +3774,8 @@
         </p:nvSpPr>
         <p:spPr>
           <a:xfrm>
-            <a:off x="9753600" y="10591800"/>
-            <a:ext cx="9525000" cy="6172200"/>
+            <a:off x="5181600" y="10591800"/>
+            <a:ext cx="14097000" cy="15773400"/>
           </a:xfrm>
           <a:prstGeom prst="rect">
             <a:avLst/>
@@ -3814,8 +3815,8 @@
         </p:nvSpPr>
         <p:spPr>
           <a:xfrm>
-            <a:off x="9905999" y="10744200"/>
-            <a:ext cx="9181757" cy="2362200"/>
+            <a:off x="5334001" y="10744200"/>
+            <a:ext cx="13753756" cy="2362200"/>
           </a:xfrm>
           <a:prstGeom prst="rect">
             <a:avLst/>
@@ -3855,8 +3856,8 @@
         </p:nvSpPr>
         <p:spPr>
           <a:xfrm>
-            <a:off x="9906000" y="13258802"/>
-            <a:ext cx="4876800" cy="2285998"/>
+            <a:off x="5334000" y="13258802"/>
+            <a:ext cx="4876800" cy="5181598"/>
           </a:xfrm>
           <a:prstGeom prst="rect">
             <a:avLst/>
@@ -3896,8 +3897,8 @@
         </p:nvSpPr>
         <p:spPr>
           <a:xfrm>
-            <a:off x="14935200" y="13258800"/>
-            <a:ext cx="4114800" cy="2286000"/>
+            <a:off x="20116800" y="9906000"/>
+            <a:ext cx="4114800" cy="5257800"/>
           </a:xfrm>
           <a:prstGeom prst="rect">
             <a:avLst/>
@@ -3937,8 +3938,8 @@
         </p:nvSpPr>
         <p:spPr>
           <a:xfrm>
-            <a:off x="9906001" y="10744200"/>
-            <a:ext cx="1097801" cy="369332"/>
+            <a:off x="5379199" y="10832068"/>
+            <a:ext cx="1929695" cy="369332"/>
           </a:xfrm>
           <a:prstGeom prst="rect">
             <a:avLst/>
@@ -3953,7 +3954,7 @@
           <a:p>
             <a:r>
               <a:rPr lang="en-US" b="1" dirty="0" smtClean="0"/>
-              <a:t>Summary</a:t>
+              <a:t>Account Summary</a:t>
             </a:r>
             <a:endParaRPr lang="en-US" b="1" dirty="0"/>
           </a:p>
@@ -3967,7 +3968,7 @@
         </p:nvSpPr>
         <p:spPr>
           <a:xfrm>
-            <a:off x="9906001" y="11430000"/>
+            <a:off x="5410201" y="11430000"/>
             <a:ext cx="2337499" cy="369332"/>
           </a:xfrm>
           <a:prstGeom prst="rect">
@@ -3997,7 +3998,7 @@
         </p:nvSpPr>
         <p:spPr>
           <a:xfrm>
-            <a:off x="9906000" y="11746468"/>
+            <a:off x="5410200" y="11746468"/>
             <a:ext cx="2342308" cy="369332"/>
           </a:xfrm>
           <a:prstGeom prst="rect">
@@ -4027,7 +4028,7 @@
         </p:nvSpPr>
         <p:spPr>
           <a:xfrm>
-            <a:off x="9906001" y="12051268"/>
+            <a:off x="5410201" y="12051268"/>
             <a:ext cx="2333075" cy="369332"/>
           </a:xfrm>
           <a:prstGeom prst="rect">
@@ -4061,7 +4062,7 @@
         </p:nvSpPr>
         <p:spPr>
           <a:xfrm>
-            <a:off x="9906001" y="12344400"/>
+            <a:off x="5410201" y="12344400"/>
             <a:ext cx="2228687" cy="369332"/>
           </a:xfrm>
           <a:prstGeom prst="rect">
@@ -4091,7 +4092,7 @@
         </p:nvSpPr>
         <p:spPr>
           <a:xfrm>
-            <a:off x="9906001" y="12660868"/>
+            <a:off x="5405021" y="12660868"/>
             <a:ext cx="2367379" cy="369332"/>
           </a:xfrm>
           <a:prstGeom prst="rect">
@@ -4125,8 +4126,8 @@
         </p:nvSpPr>
         <p:spPr>
           <a:xfrm>
-            <a:off x="9906000" y="11125200"/>
-            <a:ext cx="734496" cy="369332"/>
+            <a:off x="5410200" y="11125200"/>
+            <a:ext cx="691215" cy="369332"/>
           </a:xfrm>
           <a:prstGeom prst="rect">
             <a:avLst/>
@@ -4141,7 +4142,7 @@
           <a:p>
             <a:r>
               <a:rPr lang="en-US" u="sng" dirty="0" smtClean="0"/>
-              <a:t>DEBIT</a:t>
+              <a:t>CASH</a:t>
             </a:r>
             <a:endParaRPr lang="en-US" u="sng" dirty="0"/>
           </a:p>
@@ -4155,7 +4156,7 @@
         </p:nvSpPr>
         <p:spPr>
           <a:xfrm>
-            <a:off x="12400874" y="11125200"/>
+            <a:off x="10032208" y="11136868"/>
             <a:ext cx="857927" cy="369332"/>
           </a:xfrm>
           <a:prstGeom prst="rect">
@@ -4185,8 +4186,8 @@
         </p:nvSpPr>
         <p:spPr>
           <a:xfrm>
-            <a:off x="12420600" y="11506200"/>
-            <a:ext cx="2199000" cy="369332"/>
+            <a:off x="10032208" y="11430000"/>
+            <a:ext cx="3988592" cy="369332"/>
           </a:xfrm>
           <a:prstGeom prst="rect">
             <a:avLst/>
@@ -4201,7 +4202,7 @@
           <a:p>
             <a:r>
               <a:rPr lang="en-US" dirty="0" smtClean="0"/>
-              <a:t>David:       P12,000.00</a:t>
+              <a:t>Employees’ Salaries(To pay): P15,000.00</a:t>
             </a:r>
             <a:endParaRPr lang="en-US" dirty="0"/>
           </a:p>
@@ -4209,14 +4210,14 @@
       </p:sp>
       <p:sp>
         <p:nvSpPr>
-          <p:cNvPr id="112" name="TextBox 111"/>
+          <p:cNvPr id="113" name="TextBox 112"/>
           <p:cNvSpPr txBox="1"/>
           <p:nvPr/>
         </p:nvSpPr>
         <p:spPr>
           <a:xfrm>
-            <a:off x="12420601" y="11822668"/>
-            <a:ext cx="2098651" cy="369332"/>
+            <a:off x="10033326" y="12649200"/>
+            <a:ext cx="3954352" cy="369332"/>
           </a:xfrm>
           <a:prstGeom prst="rect">
             <a:avLst/>
@@ -4230,8 +4231,12 @@
           <a:lstStyle/>
           <a:p>
             <a:r>
+              <a:rPr lang="en-US" b="1" dirty="0" smtClean="0"/>
+              <a:t>TOTAL</a:t>
+            </a:r>
+            <a:r>
               <a:rPr lang="en-US" dirty="0" smtClean="0"/>
-              <a:t>John:         P4,500.00</a:t>
+              <a:t>:                                       P24,500.00</a:t>
             </a:r>
             <a:endParaRPr lang="en-US" dirty="0"/>
           </a:p>
@@ -4239,14 +4244,14 @@
       </p:sp>
       <p:sp>
         <p:nvSpPr>
-          <p:cNvPr id="113" name="TextBox 112"/>
+          <p:cNvPr id="116" name="TextBox 115"/>
           <p:cNvSpPr txBox="1"/>
           <p:nvPr/>
         </p:nvSpPr>
         <p:spPr>
           <a:xfrm>
-            <a:off x="12415421" y="12649200"/>
-            <a:ext cx="2208682" cy="369332"/>
+            <a:off x="15697200" y="11136868"/>
+            <a:ext cx="1327864" cy="369332"/>
           </a:xfrm>
           <a:prstGeom prst="rect">
             <a:avLst/>
@@ -4260,60 +4265,23 @@
           <a:lstStyle/>
           <a:p>
             <a:r>
-              <a:rPr lang="en-US" b="1" dirty="0" smtClean="0"/>
-              <a:t>TOTAL</a:t>
-            </a:r>
-            <a:r>
-              <a:rPr lang="en-US" dirty="0" smtClean="0"/>
-              <a:t>:      P16,500.00</a:t>
-            </a:r>
-            <a:endParaRPr lang="en-US" dirty="0"/>
-          </a:p>
-        </p:txBody>
-      </p:sp>
-      <p:cxnSp>
-        <p:nvCxnSpPr>
-          <p:cNvPr id="114" name="Straight Arrow Connector 113"/>
-          <p:cNvCxnSpPr/>
-          <p:nvPr/>
-        </p:nvCxnSpPr>
-        <p:spPr>
-          <a:xfrm rot="10800000" flipV="1">
-            <a:off x="12801600" y="10210800"/>
-            <a:ext cx="2971800" cy="1447800"/>
-          </a:xfrm>
-          <a:prstGeom prst="straightConnector1">
-            <a:avLst/>
-          </a:prstGeom>
-          <a:ln>
-            <a:tailEnd type="arrow"/>
-          </a:ln>
-        </p:spPr>
-        <p:style>
-          <a:lnRef idx="1">
-            <a:schemeClr val="accent1"/>
-          </a:lnRef>
-          <a:fillRef idx="0">
-            <a:schemeClr val="accent1"/>
-          </a:fillRef>
-          <a:effectRef idx="0">
-            <a:schemeClr val="accent1"/>
-          </a:effectRef>
-          <a:fontRef idx="minor">
-            <a:schemeClr val="tx1"/>
-          </a:fontRef>
-        </p:style>
-      </p:cxnSp>
-      <p:sp>
-        <p:nvSpPr>
-          <p:cNvPr id="115" name="TextBox 114"/>
+              <a:rPr lang="en-US" u="sng" dirty="0" smtClean="0"/>
+              <a:t>NET PROFIT:</a:t>
+            </a:r>
+            <a:endParaRPr lang="en-US" u="sng" dirty="0"/>
+          </a:p>
+        </p:txBody>
+      </p:sp>
+      <p:sp>
+        <p:nvSpPr>
+          <p:cNvPr id="117" name="TextBox 116"/>
           <p:cNvSpPr txBox="1"/>
           <p:nvPr/>
         </p:nvSpPr>
         <p:spPr>
           <a:xfrm>
-            <a:off x="15392401" y="9982200"/>
-            <a:ext cx="971741" cy="261610"/>
+            <a:off x="15697200" y="11506200"/>
+            <a:ext cx="1843774" cy="523220"/>
           </a:xfrm>
           <a:prstGeom prst="rect">
             <a:avLst/>
@@ -4327,23 +4295,23 @@
           <a:lstStyle/>
           <a:p>
             <a:r>
-              <a:rPr lang="en-US" sz="1100" dirty="0" smtClean="0"/>
-              <a:t>Link to Profile</a:t>
-            </a:r>
-            <a:endParaRPr lang="en-US" sz="1100" dirty="0"/>
-          </a:p>
-        </p:txBody>
-      </p:sp>
-      <p:sp>
-        <p:nvSpPr>
-          <p:cNvPr id="116" name="TextBox 115"/>
+              <a:rPr lang="en-US" sz="2800" b="1" dirty="0" smtClean="0"/>
+              <a:t>P40,500.00</a:t>
+            </a:r>
+            <a:endParaRPr lang="en-US" sz="2800" b="1" dirty="0"/>
+          </a:p>
+        </p:txBody>
+      </p:sp>
+      <p:sp>
+        <p:nvSpPr>
+          <p:cNvPr id="118" name="TextBox 117"/>
           <p:cNvSpPr txBox="1"/>
           <p:nvPr/>
         </p:nvSpPr>
         <p:spPr>
           <a:xfrm>
-            <a:off x="17096454" y="11605736"/>
-            <a:ext cx="1572546" cy="369332"/>
+            <a:off x="15707418" y="10820400"/>
+            <a:ext cx="3342582" cy="369332"/>
           </a:xfrm>
           <a:prstGeom prst="rect">
             <a:avLst/>
@@ -4357,100 +4325,10 @@
           <a:lstStyle/>
           <a:p>
             <a:r>
-              <a:rPr lang="en-US" u="sng" dirty="0" smtClean="0"/>
-              <a:t>GRAND TOTAL:</a:t>
-            </a:r>
-            <a:endParaRPr lang="en-US" u="sng" dirty="0"/>
-          </a:p>
-        </p:txBody>
-      </p:sp>
-      <p:sp>
-        <p:nvSpPr>
-          <p:cNvPr id="117" name="TextBox 116"/>
-          <p:cNvSpPr txBox="1"/>
-          <p:nvPr/>
-        </p:nvSpPr>
-        <p:spPr>
-          <a:xfrm>
-            <a:off x="17144397" y="11898868"/>
-            <a:ext cx="1247457" cy="369332"/>
-          </a:xfrm>
-          <a:prstGeom prst="rect">
-            <a:avLst/>
-          </a:prstGeom>
-          <a:noFill/>
-        </p:spPr>
-        <p:txBody>
-          <a:bodyPr wrap="none" rtlCol="0">
-            <a:spAutoFit/>
-          </a:bodyPr>
-          <a:lstStyle/>
-          <a:p>
-            <a:r>
-              <a:rPr lang="en-US" b="1" dirty="0" smtClean="0"/>
-              <a:t>P36,500.00</a:t>
-            </a:r>
-            <a:endParaRPr lang="en-US" b="1" dirty="0"/>
-          </a:p>
-        </p:txBody>
-      </p:sp>
-      <p:sp>
-        <p:nvSpPr>
-          <p:cNvPr id="118" name="TextBox 117"/>
-          <p:cNvSpPr txBox="1"/>
-          <p:nvPr/>
-        </p:nvSpPr>
-        <p:spPr>
-          <a:xfrm>
-            <a:off x="17026689" y="10820400"/>
-            <a:ext cx="2023311" cy="369332"/>
-          </a:xfrm>
-          <a:prstGeom prst="rect">
-            <a:avLst/>
-          </a:prstGeom>
-          <a:noFill/>
-        </p:spPr>
-        <p:txBody>
-          <a:bodyPr wrap="none" rtlCol="0">
-            <a:spAutoFit/>
-          </a:bodyPr>
-          <a:lstStyle/>
-          <a:p>
-            <a:r>
               <a:rPr lang="en-US" dirty="0" smtClean="0"/>
-              <a:t>December 25, 2016</a:t>
+              <a:t>December 1 - December 25, 2016</a:t>
             </a:r>
             <a:endParaRPr lang="en-US" dirty="0"/>
-          </a:p>
-        </p:txBody>
-      </p:sp>
-      <p:sp>
-        <p:nvSpPr>
-          <p:cNvPr id="119" name="TextBox 118"/>
-          <p:cNvSpPr txBox="1"/>
-          <p:nvPr/>
-        </p:nvSpPr>
-        <p:spPr>
-          <a:xfrm>
-            <a:off x="9906001" y="13335000"/>
-            <a:ext cx="1118063" cy="369332"/>
-          </a:xfrm>
-          <a:prstGeom prst="rect">
-            <a:avLst/>
-          </a:prstGeom>
-          <a:noFill/>
-        </p:spPr>
-        <p:txBody>
-          <a:bodyPr wrap="none" rtlCol="0">
-            <a:spAutoFit/>
-          </a:bodyPr>
-          <a:lstStyle/>
-          <a:p>
-            <a:r>
-              <a:rPr lang="en-US" b="1" dirty="0" smtClean="0"/>
-              <a:t>Payments</a:t>
-            </a:r>
-            <a:endParaRPr lang="en-US" b="1" dirty="0"/>
           </a:p>
         </p:txBody>
       </p:sp>
@@ -4463,7 +4341,7 @@
           <p:nvPr/>
         </p:nvGraphicFramePr>
         <p:xfrm>
-          <a:off x="9982200" y="13716000"/>
+          <a:off x="5410200" y="13716000"/>
           <a:ext cx="4648200" cy="1656080"/>
         </p:xfrm>
         <a:graphic>
@@ -4675,7 +4553,7 @@
         </p:nvSpPr>
         <p:spPr>
           <a:xfrm>
-            <a:off x="13411201" y="13346668"/>
+            <a:off x="8839201" y="13346668"/>
             <a:ext cx="760849" cy="369332"/>
           </a:xfrm>
           <a:prstGeom prst="rect">
@@ -4697,134 +4575,150 @@
           </a:p>
         </p:txBody>
       </p:sp>
-      <p:sp>
-        <p:nvSpPr>
-          <p:cNvPr id="122" name="Rectangle 121"/>
-          <p:cNvSpPr/>
+      <p:grpSp>
+        <p:nvGrpSpPr>
+          <p:cNvPr id="48" name="Group 47"/>
+          <p:cNvGrpSpPr/>
           <p:nvPr/>
-        </p:nvSpPr>
-        <p:spPr>
-          <a:xfrm>
-            <a:off x="14173200" y="13335000"/>
-            <a:ext cx="457200" cy="304800"/>
-          </a:xfrm>
-          <a:prstGeom prst="rect">
-            <a:avLst/>
-          </a:prstGeom>
-          <a:noFill/>
-          <a:ln>
-            <a:solidFill>
-              <a:schemeClr val="tx1"/>
-            </a:solidFill>
-          </a:ln>
-        </p:spPr>
-        <p:style>
-          <a:lnRef idx="2">
-            <a:schemeClr val="accent1">
-              <a:shade val="50000"/>
-            </a:schemeClr>
-          </a:lnRef>
-          <a:fillRef idx="1">
-            <a:schemeClr val="accent1"/>
-          </a:fillRef>
-          <a:effectRef idx="0">
-            <a:schemeClr val="accent1"/>
-          </a:effectRef>
-          <a:fontRef idx="minor">
-            <a:schemeClr val="lt1"/>
-          </a:fontRef>
-        </p:style>
-        <p:txBody>
-          <a:bodyPr rtlCol="0" anchor="ctr"/>
-          <a:lstStyle/>
-          <a:p>
-            <a:pPr algn="ctr"/>
-            <a:endParaRPr lang="en-US"/>
-          </a:p>
-        </p:txBody>
-      </p:sp>
-      <p:sp>
-        <p:nvSpPr>
-          <p:cNvPr id="123" name="TextBox 122"/>
-          <p:cNvSpPr txBox="1"/>
-          <p:nvPr/>
-        </p:nvSpPr>
-        <p:spPr>
-          <a:xfrm>
-            <a:off x="14135496" y="13270468"/>
-            <a:ext cx="418704" cy="369332"/>
-          </a:xfrm>
-          <a:prstGeom prst="rect">
-            <a:avLst/>
-          </a:prstGeom>
-          <a:noFill/>
-        </p:spPr>
-        <p:txBody>
-          <a:bodyPr wrap="none" rtlCol="0">
-            <a:spAutoFit/>
-          </a:bodyPr>
-          <a:lstStyle/>
-          <a:p>
-            <a:r>
-              <a:rPr lang="en-US" dirty="0" smtClean="0"/>
-              <a:t>10</a:t>
-            </a:r>
-            <a:endParaRPr lang="en-US" dirty="0"/>
-          </a:p>
-        </p:txBody>
-      </p:sp>
-      <p:sp>
-        <p:nvSpPr>
-          <p:cNvPr id="124" name="Isosceles Triangle 123"/>
-          <p:cNvSpPr/>
-          <p:nvPr/>
-        </p:nvSpPr>
-        <p:spPr>
-          <a:xfrm rot="10800000">
-            <a:off x="14478000" y="13411199"/>
-            <a:ext cx="152400" cy="228600"/>
-          </a:xfrm>
-          <a:prstGeom prst="triangle">
-            <a:avLst/>
-          </a:prstGeom>
-        </p:spPr>
-        <p:style>
-          <a:lnRef idx="2">
-            <a:schemeClr val="accent1">
-              <a:shade val="50000"/>
-            </a:schemeClr>
-          </a:lnRef>
-          <a:fillRef idx="1">
-            <a:schemeClr val="accent1"/>
-          </a:fillRef>
-          <a:effectRef idx="0">
-            <a:schemeClr val="accent1"/>
-          </a:effectRef>
-          <a:fontRef idx="minor">
-            <a:schemeClr val="lt1"/>
-          </a:fontRef>
-        </p:style>
-        <p:txBody>
-          <a:bodyPr rtlCol="0" anchor="ctr"/>
-          <a:lstStyle/>
-          <a:p>
-            <a:pPr algn="ctr"/>
-            <a:endParaRPr lang="en-US"/>
-          </a:p>
-        </p:txBody>
-      </p:sp>
+        </p:nvGrpSpPr>
+        <p:grpSpPr>
+          <a:xfrm>
+            <a:off x="9525000" y="13258800"/>
+            <a:ext cx="533400" cy="381000"/>
+            <a:chOff x="14097000" y="13258800"/>
+            <a:chExt cx="533400" cy="381000"/>
+          </a:xfrm>
+        </p:grpSpPr>
+        <p:sp>
+          <p:nvSpPr>
+            <p:cNvPr id="122" name="Rectangle 121"/>
+            <p:cNvSpPr/>
+            <p:nvPr/>
+          </p:nvSpPr>
+          <p:spPr>
+            <a:xfrm>
+              <a:off x="14173200" y="13335000"/>
+              <a:ext cx="457200" cy="304800"/>
+            </a:xfrm>
+            <a:prstGeom prst="rect">
+              <a:avLst/>
+            </a:prstGeom>
+            <a:noFill/>
+            <a:ln>
+              <a:solidFill>
+                <a:schemeClr val="tx1"/>
+              </a:solidFill>
+            </a:ln>
+          </p:spPr>
+          <p:style>
+            <a:lnRef idx="2">
+              <a:schemeClr val="accent1">
+                <a:shade val="50000"/>
+              </a:schemeClr>
+            </a:lnRef>
+            <a:fillRef idx="1">
+              <a:schemeClr val="accent1"/>
+            </a:fillRef>
+            <a:effectRef idx="0">
+              <a:schemeClr val="accent1"/>
+            </a:effectRef>
+            <a:fontRef idx="minor">
+              <a:schemeClr val="lt1"/>
+            </a:fontRef>
+          </p:style>
+          <p:txBody>
+            <a:bodyPr rtlCol="0" anchor="ctr"/>
+            <a:lstStyle/>
+            <a:p>
+              <a:pPr algn="ctr"/>
+              <a:endParaRPr lang="en-US"/>
+            </a:p>
+          </p:txBody>
+        </p:sp>
+        <p:sp>
+          <p:nvSpPr>
+            <p:cNvPr id="123" name="TextBox 122"/>
+            <p:cNvSpPr txBox="1"/>
+            <p:nvPr/>
+          </p:nvSpPr>
+          <p:spPr>
+            <a:xfrm>
+              <a:off x="14097000" y="13258800"/>
+              <a:ext cx="418704" cy="369332"/>
+            </a:xfrm>
+            <a:prstGeom prst="rect">
+              <a:avLst/>
+            </a:prstGeom>
+            <a:noFill/>
+          </p:spPr>
+          <p:txBody>
+            <a:bodyPr wrap="none" rtlCol="0">
+              <a:spAutoFit/>
+            </a:bodyPr>
+            <a:lstStyle/>
+            <a:p>
+              <a:r>
+                <a:rPr lang="en-US" dirty="0" smtClean="0"/>
+                <a:t>10</a:t>
+              </a:r>
+              <a:endParaRPr lang="en-US" dirty="0"/>
+            </a:p>
+          </p:txBody>
+        </p:sp>
+        <p:sp>
+          <p:nvSpPr>
+            <p:cNvPr id="124" name="Isosceles Triangle 123"/>
+            <p:cNvSpPr/>
+            <p:nvPr/>
+          </p:nvSpPr>
+          <p:spPr>
+            <a:xfrm rot="10800000">
+              <a:off x="14439504" y="13399531"/>
+              <a:ext cx="152400" cy="228600"/>
+            </a:xfrm>
+            <a:prstGeom prst="triangle">
+              <a:avLst/>
+            </a:prstGeom>
+          </p:spPr>
+          <p:style>
+            <a:lnRef idx="2">
+              <a:schemeClr val="accent1">
+                <a:shade val="50000"/>
+              </a:schemeClr>
+            </a:lnRef>
+            <a:fillRef idx="1">
+              <a:schemeClr val="accent1"/>
+            </a:fillRef>
+            <a:effectRef idx="0">
+              <a:schemeClr val="accent1"/>
+            </a:effectRef>
+            <a:fontRef idx="minor">
+              <a:schemeClr val="lt1"/>
+            </a:fontRef>
+          </p:style>
+          <p:txBody>
+            <a:bodyPr rtlCol="0" anchor="ctr"/>
+            <a:lstStyle/>
+            <a:p>
+              <a:pPr algn="ctr"/>
+              <a:endParaRPr lang="en-US"/>
+            </a:p>
+          </p:txBody>
+        </p:sp>
+      </p:grpSp>
       <p:cxnSp>
         <p:nvCxnSpPr>
           <p:cNvPr id="125" name="Straight Arrow Connector 124"/>
           <p:cNvCxnSpPr>
+            <a:stCxn id="126" idx="2"/>
             <a:endCxn id="123" idx="0"/>
           </p:cNvCxnSpPr>
           <p:nvPr/>
         </p:nvCxnSpPr>
         <p:spPr>
-          <a:xfrm rot="5400000">
-            <a:off x="13986490" y="10797758"/>
-            <a:ext cx="2831068" cy="2114352"/>
+          <a:xfrm rot="16200000" flipH="1">
+            <a:off x="7891451" y="11415898"/>
+            <a:ext cx="3226713" cy="459089"/>
           </a:xfrm>
           <a:prstGeom prst="straightConnector1">
             <a:avLst/>
@@ -4856,7 +4750,7 @@
         </p:nvSpPr>
         <p:spPr>
           <a:xfrm>
-            <a:off x="16383001" y="9982202"/>
+            <a:off x="8686800" y="9601200"/>
             <a:ext cx="1176925" cy="430887"/>
           </a:xfrm>
           <a:prstGeom prst="rect">
@@ -4891,9 +4785,9 @@
           <p:nvPr/>
         </p:nvCxnSpPr>
         <p:spPr>
-          <a:xfrm rot="5400000">
-            <a:off x="10515600" y="11506200"/>
-            <a:ext cx="4191000" cy="1752600"/>
+          <a:xfrm>
+            <a:off x="4343400" y="13487400"/>
+            <a:ext cx="2895600" cy="990600"/>
           </a:xfrm>
           <a:prstGeom prst="straightConnector1">
             <a:avLst/>
@@ -4925,7 +4819,7 @@
         </p:nvSpPr>
         <p:spPr>
           <a:xfrm>
-            <a:off x="13182601" y="9982200"/>
+            <a:off x="3581400" y="13335000"/>
             <a:ext cx="755335" cy="261610"/>
           </a:xfrm>
           <a:prstGeom prst="rect">
@@ -4954,9 +4848,9 @@
           <p:nvPr/>
         </p:nvCxnSpPr>
         <p:spPr>
-          <a:xfrm rot="5400000">
-            <a:off x="11506200" y="11430000"/>
-            <a:ext cx="4191000" cy="1905000"/>
+          <a:xfrm>
+            <a:off x="4724400" y="14706600"/>
+            <a:ext cx="4419600" cy="304800"/>
           </a:xfrm>
           <a:prstGeom prst="straightConnector1">
             <a:avLst/>
@@ -4988,7 +4882,7 @@
         </p:nvSpPr>
         <p:spPr>
           <a:xfrm>
-            <a:off x="14325600" y="9677401"/>
+            <a:off x="3810000" y="14401800"/>
             <a:ext cx="990600" cy="600164"/>
           </a:xfrm>
           <a:prstGeom prst="rect">
@@ -5024,7 +4918,7 @@
         </p:nvSpPr>
         <p:spPr>
           <a:xfrm>
-            <a:off x="15011400" y="13335000"/>
+            <a:off x="20193000" y="9982200"/>
             <a:ext cx="1119602" cy="369332"/>
           </a:xfrm>
           <a:prstGeom prst="rect">
@@ -5054,7 +4948,7 @@
         </p:nvSpPr>
         <p:spPr>
           <a:xfrm>
-            <a:off x="17449801" y="13258800"/>
+            <a:off x="22631401" y="9906000"/>
             <a:ext cx="474169" cy="369332"/>
           </a:xfrm>
           <a:prstGeom prst="rect">
@@ -5076,122 +4970,137 @@
           </a:p>
         </p:txBody>
       </p:sp>
-      <p:sp>
-        <p:nvSpPr>
-          <p:cNvPr id="133" name="TextBox 132"/>
-          <p:cNvSpPr txBox="1"/>
+      <p:grpSp>
+        <p:nvGrpSpPr>
+          <p:cNvPr id="61" name="Group 60"/>
+          <p:cNvGrpSpPr/>
           <p:nvPr/>
-        </p:nvSpPr>
-        <p:spPr>
-          <a:xfrm>
-            <a:off x="17923052" y="13258800"/>
-            <a:ext cx="822148" cy="369332"/>
-          </a:xfrm>
-          <a:prstGeom prst="rect">
-            <a:avLst/>
-          </a:prstGeom>
-          <a:noFill/>
-        </p:spPr>
-        <p:txBody>
-          <a:bodyPr wrap="none" rtlCol="0">
-            <a:spAutoFit/>
-          </a:bodyPr>
-          <a:lstStyle/>
-          <a:p>
-            <a:r>
-              <a:rPr lang="en-US" dirty="0" smtClean="0"/>
-              <a:t>Month</a:t>
-            </a:r>
-            <a:endParaRPr lang="en-US" dirty="0"/>
-          </a:p>
-        </p:txBody>
-      </p:sp>
-      <p:sp>
-        <p:nvSpPr>
-          <p:cNvPr id="134" name="Isosceles Triangle 133"/>
-          <p:cNvSpPr/>
-          <p:nvPr/>
-        </p:nvSpPr>
-        <p:spPr>
-          <a:xfrm rot="10800000">
-            <a:off x="18669000" y="13411200"/>
-            <a:ext cx="152400" cy="228600"/>
-          </a:xfrm>
-          <a:prstGeom prst="triangle">
-            <a:avLst/>
-          </a:prstGeom>
-        </p:spPr>
-        <p:style>
-          <a:lnRef idx="2">
-            <a:schemeClr val="accent1">
-              <a:shade val="50000"/>
-            </a:schemeClr>
-          </a:lnRef>
-          <a:fillRef idx="1">
-            <a:schemeClr val="accent1"/>
-          </a:fillRef>
-          <a:effectRef idx="0">
-            <a:schemeClr val="accent1"/>
-          </a:effectRef>
-          <a:fontRef idx="minor">
-            <a:schemeClr val="lt1"/>
-          </a:fontRef>
-        </p:style>
-        <p:txBody>
-          <a:bodyPr rtlCol="0" anchor="ctr"/>
-          <a:lstStyle/>
-          <a:p>
-            <a:pPr algn="ctr"/>
-            <a:endParaRPr lang="en-US"/>
-          </a:p>
-        </p:txBody>
-      </p:sp>
-      <p:sp>
-        <p:nvSpPr>
-          <p:cNvPr id="135" name="Rectangle 134"/>
-          <p:cNvSpPr/>
-          <p:nvPr/>
-        </p:nvSpPr>
-        <p:spPr>
-          <a:xfrm>
-            <a:off x="17907000" y="13335000"/>
-            <a:ext cx="990600" cy="304800"/>
-          </a:xfrm>
-          <a:prstGeom prst="rect">
-            <a:avLst/>
-          </a:prstGeom>
-          <a:noFill/>
-          <a:ln>
-            <a:solidFill>
-              <a:schemeClr val="tx1"/>
-            </a:solidFill>
-          </a:ln>
-        </p:spPr>
-        <p:style>
-          <a:lnRef idx="2">
-            <a:schemeClr val="accent1">
-              <a:shade val="50000"/>
-            </a:schemeClr>
-          </a:lnRef>
-          <a:fillRef idx="1">
-            <a:schemeClr val="accent1"/>
-          </a:fillRef>
-          <a:effectRef idx="0">
-            <a:schemeClr val="accent1"/>
-          </a:effectRef>
-          <a:fontRef idx="minor">
-            <a:schemeClr val="lt1"/>
-          </a:fontRef>
-        </p:style>
-        <p:txBody>
-          <a:bodyPr rtlCol="0" anchor="ctr"/>
-          <a:lstStyle/>
-          <a:p>
-            <a:pPr algn="ctr"/>
-            <a:endParaRPr lang="en-US"/>
-          </a:p>
-        </p:txBody>
-      </p:sp>
+        </p:nvGrpSpPr>
+        <p:grpSpPr>
+          <a:xfrm>
+            <a:off x="23088600" y="9906000"/>
+            <a:ext cx="990600" cy="381000"/>
+            <a:chOff x="17907000" y="13258800"/>
+            <a:chExt cx="990600" cy="381000"/>
+          </a:xfrm>
+        </p:grpSpPr>
+        <p:sp>
+          <p:nvSpPr>
+            <p:cNvPr id="133" name="TextBox 132"/>
+            <p:cNvSpPr txBox="1"/>
+            <p:nvPr/>
+          </p:nvSpPr>
+          <p:spPr>
+            <a:xfrm>
+              <a:off x="17923052" y="13258800"/>
+              <a:ext cx="822148" cy="369332"/>
+            </a:xfrm>
+            <a:prstGeom prst="rect">
+              <a:avLst/>
+            </a:prstGeom>
+            <a:noFill/>
+          </p:spPr>
+          <p:txBody>
+            <a:bodyPr wrap="none" rtlCol="0">
+              <a:spAutoFit/>
+            </a:bodyPr>
+            <a:lstStyle/>
+            <a:p>
+              <a:r>
+                <a:rPr lang="en-US" dirty="0" smtClean="0"/>
+                <a:t>Month</a:t>
+              </a:r>
+              <a:endParaRPr lang="en-US" dirty="0"/>
+            </a:p>
+          </p:txBody>
+        </p:sp>
+        <p:sp>
+          <p:nvSpPr>
+            <p:cNvPr id="134" name="Isosceles Triangle 133"/>
+            <p:cNvSpPr/>
+            <p:nvPr/>
+          </p:nvSpPr>
+          <p:spPr>
+            <a:xfrm rot="10800000">
+              <a:off x="18669000" y="13411200"/>
+              <a:ext cx="152400" cy="228600"/>
+            </a:xfrm>
+            <a:prstGeom prst="triangle">
+              <a:avLst/>
+            </a:prstGeom>
+          </p:spPr>
+          <p:style>
+            <a:lnRef idx="2">
+              <a:schemeClr val="accent1">
+                <a:shade val="50000"/>
+              </a:schemeClr>
+            </a:lnRef>
+            <a:fillRef idx="1">
+              <a:schemeClr val="accent1"/>
+            </a:fillRef>
+            <a:effectRef idx="0">
+              <a:schemeClr val="accent1"/>
+            </a:effectRef>
+            <a:fontRef idx="minor">
+              <a:schemeClr val="lt1"/>
+            </a:fontRef>
+          </p:style>
+          <p:txBody>
+            <a:bodyPr rtlCol="0" anchor="ctr"/>
+            <a:lstStyle/>
+            <a:p>
+              <a:pPr algn="ctr"/>
+              <a:endParaRPr lang="en-US"/>
+            </a:p>
+          </p:txBody>
+        </p:sp>
+        <p:sp>
+          <p:nvSpPr>
+            <p:cNvPr id="135" name="Rectangle 134"/>
+            <p:cNvSpPr/>
+            <p:nvPr/>
+          </p:nvSpPr>
+          <p:spPr>
+            <a:xfrm>
+              <a:off x="17907000" y="13335000"/>
+              <a:ext cx="990600" cy="304800"/>
+            </a:xfrm>
+            <a:prstGeom prst="rect">
+              <a:avLst/>
+            </a:prstGeom>
+            <a:noFill/>
+            <a:ln>
+              <a:solidFill>
+                <a:schemeClr val="tx1"/>
+              </a:solidFill>
+            </a:ln>
+          </p:spPr>
+          <p:style>
+            <a:lnRef idx="2">
+              <a:schemeClr val="accent1">
+                <a:shade val="50000"/>
+              </a:schemeClr>
+            </a:lnRef>
+            <a:fillRef idx="1">
+              <a:schemeClr val="accent1"/>
+            </a:fillRef>
+            <a:effectRef idx="0">
+              <a:schemeClr val="accent1"/>
+            </a:effectRef>
+            <a:fontRef idx="minor">
+              <a:schemeClr val="lt1"/>
+            </a:fontRef>
+          </p:style>
+          <p:txBody>
+            <a:bodyPr rtlCol="0" anchor="ctr"/>
+            <a:lstStyle/>
+            <a:p>
+              <a:pPr algn="ctr"/>
+              <a:endParaRPr lang="en-US"/>
+            </a:p>
+          </p:txBody>
+        </p:sp>
+      </p:grpSp>
       <p:cxnSp>
         <p:nvCxnSpPr>
           <p:cNvPr id="136" name="Straight Arrow Connector 135"/>
@@ -5270,7 +5179,7 @@
           <p:nvPr/>
         </p:nvGraphicFramePr>
         <p:xfrm>
-          <a:off x="15087600" y="13792200"/>
+          <a:off x="20269200" y="10439400"/>
           <a:ext cx="3810000" cy="1524000"/>
         </p:xfrm>
         <a:graphic>
@@ -5324,7 +5233,7 @@
                       <a:pPr algn="ctr"/>
                       <a:r>
                         <a:rPr lang="en-US" sz="1200" dirty="0" smtClean="0"/>
-                        <a:t>December</a:t>
+                        <a:t>January</a:t>
                       </a:r>
                       <a:endParaRPr lang="en-US" sz="1200" dirty="0"/>
                     </a:p>
@@ -5356,7 +5265,7 @@
                       <a:pPr algn="ctr"/>
                       <a:r>
                         <a:rPr lang="en-US" sz="1200" dirty="0" smtClean="0"/>
-                        <a:t>November</a:t>
+                        <a:t>February</a:t>
                       </a:r>
                       <a:endParaRPr lang="en-US" sz="1200" dirty="0"/>
                     </a:p>
@@ -5385,77 +5294,13 @@
       </p:graphicFrame>
       <p:sp>
         <p:nvSpPr>
-          <p:cNvPr id="139" name="TextBox 138"/>
-          <p:cNvSpPr txBox="1"/>
-          <p:nvPr/>
-        </p:nvSpPr>
-        <p:spPr>
-          <a:xfrm>
-            <a:off x="14724135" y="11125200"/>
-            <a:ext cx="1811265" cy="369332"/>
-          </a:xfrm>
-          <a:prstGeom prst="rect">
-            <a:avLst/>
-          </a:prstGeom>
-          <a:noFill/>
-        </p:spPr>
-        <p:txBody>
-          <a:bodyPr wrap="none" rtlCol="0">
-            <a:spAutoFit/>
-          </a:bodyPr>
-          <a:lstStyle/>
-          <a:p>
-            <a:r>
-              <a:rPr lang="en-US" u="sng" dirty="0" smtClean="0"/>
-              <a:t>OTHER EXPENSES</a:t>
-            </a:r>
-            <a:endParaRPr lang="en-US" u="sng" dirty="0"/>
-          </a:p>
-        </p:txBody>
-      </p:sp>
-      <p:sp>
-        <p:nvSpPr>
-          <p:cNvPr id="141" name="TextBox 140"/>
-          <p:cNvSpPr txBox="1"/>
-          <p:nvPr/>
-        </p:nvSpPr>
-        <p:spPr>
-          <a:xfrm>
-            <a:off x="14783918" y="11506200"/>
-            <a:ext cx="1944187" cy="369332"/>
-          </a:xfrm>
-          <a:prstGeom prst="rect">
-            <a:avLst/>
-          </a:prstGeom>
-          <a:noFill/>
-        </p:spPr>
-        <p:txBody>
-          <a:bodyPr wrap="none" rtlCol="0">
-            <a:spAutoFit/>
-          </a:bodyPr>
-          <a:lstStyle/>
-          <a:p>
-            <a:r>
-              <a:rPr lang="en-US" b="1" dirty="0" smtClean="0"/>
-              <a:t>TOTAL</a:t>
-            </a:r>
-            <a:r>
-              <a:rPr lang="en-US" dirty="0" smtClean="0"/>
-              <a:t>: P12,000.00</a:t>
-            </a:r>
-            <a:endParaRPr lang="en-US" dirty="0"/>
-          </a:p>
-        </p:txBody>
-      </p:sp>
-      <p:sp>
-        <p:nvSpPr>
           <p:cNvPr id="143" name="Rectangle 142"/>
           <p:cNvSpPr/>
           <p:nvPr/>
         </p:nvSpPr>
         <p:spPr>
           <a:xfrm>
-            <a:off x="9906000" y="15773400"/>
+            <a:off x="20955000" y="16840200"/>
             <a:ext cx="1905000" cy="533400"/>
           </a:xfrm>
           <a:prstGeom prst="rect">
@@ -5508,7 +5353,7 @@
         </p:nvSpPr>
         <p:spPr>
           <a:xfrm>
-            <a:off x="14935200" y="15697200"/>
+            <a:off x="22402800" y="19354800"/>
             <a:ext cx="1905000" cy="533400"/>
           </a:xfrm>
           <a:prstGeom prst="rect">
@@ -5550,6 +5395,486 @@
                 <a:sysClr val="windowText" lastClr="000000"/>
               </a:solidFill>
             </a:endParaRPr>
+          </a:p>
+        </p:txBody>
+      </p:sp>
+      <p:sp>
+        <p:nvSpPr>
+          <p:cNvPr id="47" name="TextBox 46"/>
+          <p:cNvSpPr txBox="1"/>
+          <p:nvPr/>
+        </p:nvSpPr>
+        <p:spPr>
+          <a:xfrm>
+            <a:off x="10032208" y="11746468"/>
+            <a:ext cx="3813865" cy="369332"/>
+          </a:xfrm>
+          <a:prstGeom prst="rect">
+            <a:avLst/>
+          </a:prstGeom>
+          <a:noFill/>
+        </p:spPr>
+        <p:txBody>
+          <a:bodyPr wrap="none" rtlCol="0">
+            <a:spAutoFit/>
+          </a:bodyPr>
+          <a:lstStyle/>
+          <a:p>
+            <a:r>
+              <a:rPr lang="en-US" dirty="0" smtClean="0"/>
+              <a:t>Other Expenses:	                P9,500.00</a:t>
+            </a:r>
+            <a:endParaRPr lang="en-US" dirty="0"/>
+          </a:p>
+        </p:txBody>
+      </p:sp>
+      <p:sp>
+        <p:nvSpPr>
+          <p:cNvPr id="52" name="TextBox 51"/>
+          <p:cNvSpPr txBox="1"/>
+          <p:nvPr/>
+        </p:nvSpPr>
+        <p:spPr>
+          <a:xfrm>
+            <a:off x="7620000" y="15468600"/>
+            <a:ext cx="242374" cy="2308324"/>
+          </a:xfrm>
+          <a:prstGeom prst="rect">
+            <a:avLst/>
+          </a:prstGeom>
+          <a:noFill/>
+        </p:spPr>
+        <p:txBody>
+          <a:bodyPr wrap="none" rtlCol="0">
+            <a:spAutoFit/>
+          </a:bodyPr>
+          <a:lstStyle/>
+          <a:p>
+            <a:r>
+              <a:rPr lang="en-US" dirty="0" smtClean="0"/>
+              <a:t>.</a:t>
+            </a:r>
+            <a:br>
+              <a:rPr lang="en-US" dirty="0" smtClean="0"/>
+            </a:br>
+            <a:r>
+              <a:rPr lang="en-US" dirty="0" smtClean="0"/>
+              <a:t>.</a:t>
+            </a:r>
+          </a:p>
+          <a:p>
+            <a:r>
+              <a:rPr lang="en-US" dirty="0" smtClean="0"/>
+              <a:t>.</a:t>
+            </a:r>
+            <a:br>
+              <a:rPr lang="en-US" dirty="0" smtClean="0"/>
+            </a:br>
+            <a:r>
+              <a:rPr lang="en-US" dirty="0" smtClean="0"/>
+              <a:t>.</a:t>
+            </a:r>
+          </a:p>
+          <a:p>
+            <a:r>
+              <a:rPr lang="en-US" dirty="0" smtClean="0"/>
+              <a:t>.</a:t>
+            </a:r>
+          </a:p>
+          <a:p>
+            <a:r>
+              <a:rPr lang="en-US" dirty="0" smtClean="0"/>
+              <a:t>.</a:t>
+            </a:r>
+          </a:p>
+          <a:p>
+            <a:r>
+              <a:rPr lang="en-US" dirty="0" smtClean="0"/>
+              <a:t>.</a:t>
+            </a:r>
+          </a:p>
+          <a:p>
+            <a:r>
+              <a:rPr lang="en-US" dirty="0" smtClean="0"/>
+              <a:t>.</a:t>
+            </a:r>
+          </a:p>
+        </p:txBody>
+      </p:sp>
+      <p:graphicFrame>
+        <p:nvGraphicFramePr>
+          <p:cNvPr id="53" name="Table 52"/>
+          <p:cNvGraphicFramePr>
+            <a:graphicFrameLocks noGrp="1"/>
+          </p:cNvGraphicFramePr>
+          <p:nvPr/>
+        </p:nvGraphicFramePr>
+        <p:xfrm>
+          <a:off x="5486400" y="17754600"/>
+          <a:ext cx="4648200" cy="508000"/>
+        </p:xfrm>
+        <a:graphic>
+          <a:graphicData uri="http://schemas.openxmlformats.org/drawingml/2006/table">
+            <a:tbl>
+              <a:tblPr firstRow="1" bandRow="1">
+                <a:tableStyleId>{5940675A-B579-460E-94D1-54222C63F5DA}</a:tableStyleId>
+              </a:tblPr>
+              <a:tblGrid>
+                <a:gridCol w="1162050"/>
+                <a:gridCol w="1162050"/>
+                <a:gridCol w="1162050"/>
+                <a:gridCol w="1162050"/>
+              </a:tblGrid>
+              <a:tr h="508000">
+                <a:tc>
+                  <a:txBody>
+                    <a:bodyPr/>
+                    <a:lstStyle/>
+                    <a:p>
+                      <a:pPr algn="ctr"/>
+                      <a:r>
+                        <a:rPr lang="en-US" sz="1200" dirty="0" smtClean="0"/>
+                        <a:t>10</a:t>
+                      </a:r>
+                      <a:endParaRPr lang="en-US" sz="1200" dirty="0"/>
+                    </a:p>
+                  </a:txBody>
+                  <a:tcPr/>
+                </a:tc>
+                <a:tc>
+                  <a:txBody>
+                    <a:bodyPr/>
+                    <a:lstStyle/>
+                    <a:p>
+                      <a:pPr algn="ctr"/>
+                      <a:r>
+                        <a:rPr lang="en-US" sz="1200" dirty="0" smtClean="0"/>
+                        <a:t>Tim</a:t>
+                      </a:r>
+                      <a:endParaRPr lang="en-US" sz="1200" dirty="0"/>
+                    </a:p>
+                  </a:txBody>
+                  <a:tcPr/>
+                </a:tc>
+                <a:tc>
+                  <a:txBody>
+                    <a:bodyPr/>
+                    <a:lstStyle/>
+                    <a:p>
+                      <a:pPr algn="ctr"/>
+                      <a:r>
+                        <a:rPr lang="en-US" sz="1200" dirty="0" smtClean="0"/>
+                        <a:t>12/15/2016</a:t>
+                      </a:r>
+                      <a:endParaRPr lang="en-US" sz="1200" dirty="0"/>
+                    </a:p>
+                  </a:txBody>
+                  <a:tcPr/>
+                </a:tc>
+                <a:tc>
+                  <a:txBody>
+                    <a:bodyPr/>
+                    <a:lstStyle/>
+                    <a:p>
+                      <a:pPr algn="ctr"/>
+                      <a:r>
+                        <a:rPr lang="en-US" sz="1200" dirty="0" smtClean="0"/>
+                        <a:t>P7,000.00</a:t>
+                      </a:r>
+                    </a:p>
+                  </a:txBody>
+                  <a:tcPr/>
+                </a:tc>
+              </a:tr>
+            </a:tbl>
+          </a:graphicData>
+        </a:graphic>
+      </p:graphicFrame>
+      <p:sp>
+        <p:nvSpPr>
+          <p:cNvPr id="58" name="TextBox 57"/>
+          <p:cNvSpPr txBox="1"/>
+          <p:nvPr/>
+        </p:nvSpPr>
+        <p:spPr>
+          <a:xfrm>
+            <a:off x="22084226" y="11941076"/>
+            <a:ext cx="242374" cy="1754326"/>
+          </a:xfrm>
+          <a:prstGeom prst="rect">
+            <a:avLst/>
+          </a:prstGeom>
+          <a:noFill/>
+        </p:spPr>
+        <p:txBody>
+          <a:bodyPr wrap="none" rtlCol="0">
+            <a:spAutoFit/>
+          </a:bodyPr>
+          <a:lstStyle/>
+          <a:p>
+            <a:r>
+              <a:rPr lang="en-US" dirty="0" smtClean="0"/>
+              <a:t>.</a:t>
+            </a:r>
+            <a:br>
+              <a:rPr lang="en-US" dirty="0" smtClean="0"/>
+            </a:br>
+            <a:r>
+              <a:rPr lang="en-US" dirty="0" smtClean="0"/>
+              <a:t>.</a:t>
+            </a:r>
+          </a:p>
+          <a:p>
+            <a:r>
+              <a:rPr lang="en-US" dirty="0" smtClean="0"/>
+              <a:t>.</a:t>
+            </a:r>
+            <a:br>
+              <a:rPr lang="en-US" dirty="0" smtClean="0"/>
+            </a:br>
+            <a:r>
+              <a:rPr lang="en-US" dirty="0" smtClean="0"/>
+              <a:t>.</a:t>
+            </a:r>
+          </a:p>
+          <a:p>
+            <a:r>
+              <a:rPr lang="en-US" dirty="0" smtClean="0"/>
+              <a:t>.</a:t>
+            </a:r>
+          </a:p>
+          <a:p>
+            <a:r>
+              <a:rPr lang="en-US" dirty="0" smtClean="0"/>
+              <a:t>.</a:t>
+            </a:r>
+          </a:p>
+        </p:txBody>
+      </p:sp>
+      <p:graphicFrame>
+        <p:nvGraphicFramePr>
+          <p:cNvPr id="59" name="Table 58"/>
+          <p:cNvGraphicFramePr>
+            <a:graphicFrameLocks noGrp="1"/>
+          </p:cNvGraphicFramePr>
+          <p:nvPr/>
+        </p:nvGraphicFramePr>
+        <p:xfrm>
+          <a:off x="20193000" y="13995400"/>
+          <a:ext cx="3886200" cy="1016000"/>
+        </p:xfrm>
+        <a:graphic>
+          <a:graphicData uri="http://schemas.openxmlformats.org/drawingml/2006/table">
+            <a:tbl>
+              <a:tblPr firstRow="1" bandRow="1">
+                <a:tableStyleId>{5940675A-B579-460E-94D1-54222C63F5DA}</a:tableStyleId>
+              </a:tblPr>
+              <a:tblGrid>
+                <a:gridCol w="1943100"/>
+                <a:gridCol w="1943100"/>
+              </a:tblGrid>
+              <a:tr h="508000">
+                <a:tc>
+                  <a:txBody>
+                    <a:bodyPr/>
+                    <a:lstStyle/>
+                    <a:p>
+                      <a:pPr algn="ctr"/>
+                      <a:r>
+                        <a:rPr lang="en-US" sz="1200" dirty="0" smtClean="0"/>
+                        <a:t>December</a:t>
+                      </a:r>
+                      <a:endParaRPr lang="en-US" sz="1200" dirty="0"/>
+                    </a:p>
+                  </a:txBody>
+                  <a:tcPr/>
+                </a:tc>
+                <a:tc>
+                  <a:txBody>
+                    <a:bodyPr/>
+                    <a:lstStyle/>
+                    <a:p>
+                      <a:pPr algn="ctr"/>
+                      <a:r>
+                        <a:rPr lang="en-US" sz="1200" dirty="0" smtClean="0"/>
+                        <a:t>P9,000.00</a:t>
+                      </a:r>
+                      <a:endParaRPr lang="en-US" sz="1200" dirty="0"/>
+                    </a:p>
+                  </a:txBody>
+                  <a:tcPr/>
+                </a:tc>
+              </a:tr>
+              <a:tr h="508000">
+                <a:tc>
+                  <a:txBody>
+                    <a:bodyPr/>
+                    <a:lstStyle/>
+                    <a:p>
+                      <a:pPr algn="ctr"/>
+                      <a:r>
+                        <a:rPr lang="en-US" sz="1200" b="1" dirty="0" smtClean="0"/>
+                        <a:t>TOTAL</a:t>
+                      </a:r>
+                      <a:endParaRPr lang="en-US" sz="1200" b="1" dirty="0"/>
+                    </a:p>
+                  </a:txBody>
+                  <a:tcPr/>
+                </a:tc>
+                <a:tc>
+                  <a:txBody>
+                    <a:bodyPr/>
+                    <a:lstStyle/>
+                    <a:p>
+                      <a:pPr algn="ctr"/>
+                      <a:r>
+                        <a:rPr lang="en-US" sz="1200" b="1" dirty="0" smtClean="0"/>
+                        <a:t>P200,000</a:t>
+                      </a:r>
+                      <a:endParaRPr lang="en-US" sz="1200" b="1" dirty="0"/>
+                    </a:p>
+                  </a:txBody>
+                  <a:tcPr/>
+                </a:tc>
+              </a:tr>
+            </a:tbl>
+          </a:graphicData>
+        </a:graphic>
+      </p:graphicFrame>
+      <p:sp>
+        <p:nvSpPr>
+          <p:cNvPr id="60" name="Rectangle 59"/>
+          <p:cNvSpPr/>
+          <p:nvPr/>
+        </p:nvSpPr>
+        <p:spPr>
+          <a:xfrm>
+            <a:off x="10363200" y="13258800"/>
+            <a:ext cx="4419600" cy="5257800"/>
+          </a:xfrm>
+          <a:prstGeom prst="rect">
+            <a:avLst/>
+          </a:prstGeom>
+          <a:noFill/>
+        </p:spPr>
+        <p:style>
+          <a:lnRef idx="2">
+            <a:schemeClr val="accent1">
+              <a:shade val="50000"/>
+            </a:schemeClr>
+          </a:lnRef>
+          <a:fillRef idx="1">
+            <a:schemeClr val="accent1"/>
+          </a:fillRef>
+          <a:effectRef idx="0">
+            <a:schemeClr val="accent1"/>
+          </a:effectRef>
+          <a:fontRef idx="minor">
+            <a:schemeClr val="lt1"/>
+          </a:fontRef>
+        </p:style>
+        <p:txBody>
+          <a:bodyPr rtlCol="0" anchor="ctr"/>
+          <a:lstStyle/>
+          <a:p>
+            <a:pPr algn="ctr"/>
+            <a:endParaRPr lang="en-US"/>
+          </a:p>
+        </p:txBody>
+      </p:sp>
+    </p:spTree>
+  </p:cSld>
+  <p:clrMapOvr>
+    <a:masterClrMapping/>
+  </p:clrMapOvr>
+</p:sld>
+</file>
+
+<file path=ppt/slides/slide3.xml><?xml version="1.0" encoding="utf-8"?>
+<p:sld xmlns:a="http://schemas.openxmlformats.org/drawingml/2006/main" xmlns:r="http://schemas.openxmlformats.org/officeDocument/2006/relationships" xmlns:p="http://schemas.openxmlformats.org/presentationml/2006/main">
+  <p:cSld>
+    <p:spTree>
+      <p:nvGrpSpPr>
+        <p:cNvPr id="1" name=""/>
+        <p:cNvGrpSpPr/>
+        <p:nvPr/>
+      </p:nvGrpSpPr>
+      <p:grpSpPr>
+        <a:xfrm>
+          <a:off x="0" y="0"/>
+          <a:ext cx="0" cy="0"/>
+          <a:chOff x="0" y="0"/>
+          <a:chExt cx="0" cy="0"/>
+        </a:xfrm>
+      </p:grpSpPr>
+      <p:sp>
+        <p:nvSpPr>
+          <p:cNvPr id="4" name="TextBox 3"/>
+          <p:cNvSpPr txBox="1"/>
+          <p:nvPr/>
+        </p:nvSpPr>
+        <p:spPr>
+          <a:xfrm>
+            <a:off x="5105400" y="9982200"/>
+            <a:ext cx="1922193" cy="369332"/>
+          </a:xfrm>
+          <a:prstGeom prst="rect">
+            <a:avLst/>
+          </a:prstGeom>
+          <a:noFill/>
+        </p:spPr>
+        <p:txBody>
+          <a:bodyPr wrap="none" rtlCol="0">
+            <a:spAutoFit/>
+          </a:bodyPr>
+          <a:lstStyle/>
+          <a:p>
+            <a:r>
+              <a:rPr lang="en-US" b="1" u="sng" dirty="0" smtClean="0"/>
+              <a:t>PROJECTS LAYOUT</a:t>
+            </a:r>
+            <a:endParaRPr lang="en-US" b="1" u="sng" dirty="0"/>
+          </a:p>
+        </p:txBody>
+      </p:sp>
+      <p:sp>
+        <p:nvSpPr>
+          <p:cNvPr id="5" name="Rectangle 4"/>
+          <p:cNvSpPr/>
+          <p:nvPr/>
+        </p:nvSpPr>
+        <p:spPr>
+          <a:xfrm>
+            <a:off x="5181600" y="10591800"/>
+            <a:ext cx="14097000" cy="15773400"/>
+          </a:xfrm>
+          <a:prstGeom prst="rect">
+            <a:avLst/>
+          </a:prstGeom>
+          <a:noFill/>
+        </p:spPr>
+        <p:style>
+          <a:lnRef idx="2">
+            <a:schemeClr val="accent1">
+              <a:shade val="50000"/>
+            </a:schemeClr>
+          </a:lnRef>
+          <a:fillRef idx="1">
+            <a:schemeClr val="accent1"/>
+          </a:fillRef>
+          <a:effectRef idx="0">
+            <a:schemeClr val="accent1"/>
+          </a:effectRef>
+          <a:fontRef idx="minor">
+            <a:schemeClr val="lt1"/>
+          </a:fontRef>
+        </p:style>
+        <p:txBody>
+          <a:bodyPr rtlCol="0" anchor="ctr"/>
+          <a:lstStyle/>
+          <a:p>
+            <a:pPr algn="ctr"/>
+            <a:endParaRPr lang="en-US"/>
           </a:p>
         </p:txBody>
       </p:sp>

</xml_diff>